<commit_message>
final corrections in powerpoint
</commit_message>
<xml_diff>
--- a/Presentations/presentation_chapter1-2.pptx
+++ b/Presentations/presentation_chapter1-2.pptx
@@ -14072,7 +14072,7 @@
       </p:sp>
       <p:sp>
         <p:nvSpPr>
-          <p:cNvPr id="5" name="Oval 4"/>
+          <p:cNvPr id="5" name="Rounded Rectangle 4"/>
           <p:cNvSpPr/>
           <p:nvPr/>
         </p:nvSpPr>
@@ -14081,7 +14081,172 @@
             <a:off x="6432088" y="1474524"/>
             <a:ext cx="1183341" cy="731520"/>
           </a:xfrm>
-          <a:prstGeom prst="ellipse">
+          <a:prstGeom prst="roundRect">
+            <a:avLst/>
+          </a:prstGeom>
+        </p:spPr>
+        <p:style>
+          <a:lnRef idx="2">
+            <a:schemeClr val="accent5">
+              <a:shade val="50000"/>
+            </a:schemeClr>
+          </a:lnRef>
+          <a:fillRef idx="1">
+            <a:schemeClr val="accent5"/>
+          </a:fillRef>
+          <a:effectRef idx="0">
+            <a:schemeClr val="accent5"/>
+          </a:effectRef>
+          <a:fontRef idx="minor">
+            <a:schemeClr val="lt1"/>
+          </a:fontRef>
+        </p:style>
+        <p:txBody>
+          <a:bodyPr rtlCol="0" anchor="ctr"/>
+          <a:lstStyle/>
+          <a:p>
+            <a:pPr algn="ctr"/>
+            <a:r>
+              <a:rPr lang="en-US" dirty="0"/>
+              <a:t>2</a:t>
+            </a:r>
+          </a:p>
+        </p:txBody>
+      </p:sp>
+      <p:cxnSp>
+        <p:nvCxnSpPr>
+          <p:cNvPr id="6" name="Straight Arrow Connector 5"/>
+          <p:cNvCxnSpPr>
+            <a:endCxn id="4" idx="2"/>
+          </p:cNvCxnSpPr>
+          <p:nvPr/>
+        </p:nvCxnSpPr>
+        <p:spPr>
+          <a:xfrm>
+            <a:off x="7615429" y="1840284"/>
+            <a:ext cx="755378" cy="0"/>
+          </a:xfrm>
+          <a:prstGeom prst="straightConnector1">
+            <a:avLst/>
+          </a:prstGeom>
+          <a:ln>
+            <a:tailEnd type="triangle"/>
+          </a:ln>
+        </p:spPr>
+        <p:style>
+          <a:lnRef idx="1">
+            <a:schemeClr val="accent1"/>
+          </a:lnRef>
+          <a:fillRef idx="0">
+            <a:schemeClr val="accent1"/>
+          </a:fillRef>
+          <a:effectRef idx="0">
+            <a:schemeClr val="accent1"/>
+          </a:effectRef>
+          <a:fontRef idx="minor">
+            <a:schemeClr val="tx1"/>
+          </a:fontRef>
+        </p:style>
+      </p:cxnSp>
+      <p:sp>
+        <p:nvSpPr>
+          <p:cNvPr id="9" name="TextBox 8"/>
+          <p:cNvSpPr txBox="1"/>
+          <p:nvPr/>
+        </p:nvSpPr>
+        <p:spPr>
+          <a:xfrm>
+            <a:off x="7615429" y="1470952"/>
+            <a:ext cx="688009" cy="369332"/>
+          </a:xfrm>
+          <a:prstGeom prst="rect">
+            <a:avLst/>
+          </a:prstGeom>
+          <a:noFill/>
+        </p:spPr>
+        <p:txBody>
+          <a:bodyPr wrap="none" rtlCol="0">
+            <a:spAutoFit/>
+          </a:bodyPr>
+          <a:lstStyle/>
+          <a:p>
+            <a:r>
+              <a:rPr lang="en-US" dirty="0"/>
+              <a:t>w = 4</a:t>
+            </a:r>
+          </a:p>
+        </p:txBody>
+      </p:sp>
+      <p:sp>
+        <p:nvSpPr>
+          <p:cNvPr id="10" name="TextBox 9"/>
+          <p:cNvSpPr txBox="1"/>
+          <p:nvPr/>
+        </p:nvSpPr>
+        <p:spPr>
+          <a:xfrm>
+            <a:off x="10164861" y="2021378"/>
+            <a:ext cx="1552028" cy="369332"/>
+          </a:xfrm>
+          <a:prstGeom prst="rect">
+            <a:avLst/>
+          </a:prstGeom>
+          <a:noFill/>
+        </p:spPr>
+        <p:txBody>
+          <a:bodyPr wrap="none" rtlCol="0">
+            <a:spAutoFit/>
+          </a:bodyPr>
+          <a:lstStyle/>
+          <a:p>
+            <a:r>
+              <a:rPr lang="en-US" dirty="0"/>
+              <a:t>Target value: 6</a:t>
+            </a:r>
+          </a:p>
+        </p:txBody>
+      </p:sp>
+      <p:sp>
+        <p:nvSpPr>
+          <p:cNvPr id="11" name="TextBox 10"/>
+          <p:cNvSpPr txBox="1"/>
+          <p:nvPr/>
+        </p:nvSpPr>
+        <p:spPr>
+          <a:xfrm>
+            <a:off x="10164860" y="1652046"/>
+            <a:ext cx="1867306" cy="369332"/>
+          </a:xfrm>
+          <a:prstGeom prst="rect">
+            <a:avLst/>
+          </a:prstGeom>
+          <a:noFill/>
+        </p:spPr>
+        <p:txBody>
+          <a:bodyPr wrap="none" rtlCol="0">
+            <a:spAutoFit/>
+          </a:bodyPr>
+          <a:lstStyle/>
+          <a:p>
+            <a:r>
+              <a:rPr lang="en-US" dirty="0"/>
+              <a:t>Predicted value: 8</a:t>
+            </a:r>
+          </a:p>
+        </p:txBody>
+      </p:sp>
+      <p:sp>
+        <p:nvSpPr>
+          <p:cNvPr id="12" name="Right Arrow 11"/>
+          <p:cNvSpPr/>
+          <p:nvPr/>
+        </p:nvSpPr>
+        <p:spPr>
+          <a:xfrm>
+            <a:off x="9707962" y="1601482"/>
+            <a:ext cx="456898" cy="484632"/>
+          </a:xfrm>
+          <a:prstGeom prst="rightArrow">
             <a:avLst/>
           </a:prstGeom>
         </p:spPr>
@@ -14106,172 +14271,6 @@
           <a:lstStyle/>
           <a:p>
             <a:pPr algn="ctr"/>
-            <a:r>
-              <a:rPr lang="en-US" dirty="0"/>
-              <a:t>2</a:t>
-            </a:r>
-          </a:p>
-        </p:txBody>
-      </p:sp>
-      <p:cxnSp>
-        <p:nvCxnSpPr>
-          <p:cNvPr id="6" name="Straight Arrow Connector 5"/>
-          <p:cNvCxnSpPr>
-            <a:stCxn id="5" idx="6"/>
-            <a:endCxn id="4" idx="2"/>
-          </p:cNvCxnSpPr>
-          <p:nvPr/>
-        </p:nvCxnSpPr>
-        <p:spPr>
-          <a:xfrm>
-            <a:off x="7615429" y="1840284"/>
-            <a:ext cx="755378" cy="0"/>
-          </a:xfrm>
-          <a:prstGeom prst="straightConnector1">
-            <a:avLst/>
-          </a:prstGeom>
-          <a:ln>
-            <a:tailEnd type="triangle"/>
-          </a:ln>
-        </p:spPr>
-        <p:style>
-          <a:lnRef idx="1">
-            <a:schemeClr val="accent1"/>
-          </a:lnRef>
-          <a:fillRef idx="0">
-            <a:schemeClr val="accent1"/>
-          </a:fillRef>
-          <a:effectRef idx="0">
-            <a:schemeClr val="accent1"/>
-          </a:effectRef>
-          <a:fontRef idx="minor">
-            <a:schemeClr val="tx1"/>
-          </a:fontRef>
-        </p:style>
-      </p:cxnSp>
-      <p:sp>
-        <p:nvSpPr>
-          <p:cNvPr id="9" name="TextBox 8"/>
-          <p:cNvSpPr txBox="1"/>
-          <p:nvPr/>
-        </p:nvSpPr>
-        <p:spPr>
-          <a:xfrm>
-            <a:off x="7615429" y="1470952"/>
-            <a:ext cx="688009" cy="369332"/>
-          </a:xfrm>
-          <a:prstGeom prst="rect">
-            <a:avLst/>
-          </a:prstGeom>
-          <a:noFill/>
-        </p:spPr>
-        <p:txBody>
-          <a:bodyPr wrap="none" rtlCol="0">
-            <a:spAutoFit/>
-          </a:bodyPr>
-          <a:lstStyle/>
-          <a:p>
-            <a:r>
-              <a:rPr lang="en-US" dirty="0"/>
-              <a:t>w = 4</a:t>
-            </a:r>
-          </a:p>
-        </p:txBody>
-      </p:sp>
-      <p:sp>
-        <p:nvSpPr>
-          <p:cNvPr id="10" name="TextBox 9"/>
-          <p:cNvSpPr txBox="1"/>
-          <p:nvPr/>
-        </p:nvSpPr>
-        <p:spPr>
-          <a:xfrm>
-            <a:off x="10164861" y="2021378"/>
-            <a:ext cx="1552028" cy="369332"/>
-          </a:xfrm>
-          <a:prstGeom prst="rect">
-            <a:avLst/>
-          </a:prstGeom>
-          <a:noFill/>
-        </p:spPr>
-        <p:txBody>
-          <a:bodyPr wrap="none" rtlCol="0">
-            <a:spAutoFit/>
-          </a:bodyPr>
-          <a:lstStyle/>
-          <a:p>
-            <a:r>
-              <a:rPr lang="en-US" dirty="0"/>
-              <a:t>Target value: 6</a:t>
-            </a:r>
-          </a:p>
-        </p:txBody>
-      </p:sp>
-      <p:sp>
-        <p:nvSpPr>
-          <p:cNvPr id="11" name="TextBox 10"/>
-          <p:cNvSpPr txBox="1"/>
-          <p:nvPr/>
-        </p:nvSpPr>
-        <p:spPr>
-          <a:xfrm>
-            <a:off x="10164860" y="1652046"/>
-            <a:ext cx="1867306" cy="369332"/>
-          </a:xfrm>
-          <a:prstGeom prst="rect">
-            <a:avLst/>
-          </a:prstGeom>
-          <a:noFill/>
-        </p:spPr>
-        <p:txBody>
-          <a:bodyPr wrap="none" rtlCol="0">
-            <a:spAutoFit/>
-          </a:bodyPr>
-          <a:lstStyle/>
-          <a:p>
-            <a:r>
-              <a:rPr lang="en-US" dirty="0"/>
-              <a:t>Predicted value: 8</a:t>
-            </a:r>
-          </a:p>
-        </p:txBody>
-      </p:sp>
-      <p:sp>
-        <p:nvSpPr>
-          <p:cNvPr id="12" name="Right Arrow 11"/>
-          <p:cNvSpPr/>
-          <p:nvPr/>
-        </p:nvSpPr>
-        <p:spPr>
-          <a:xfrm>
-            <a:off x="9707962" y="1601482"/>
-            <a:ext cx="456898" cy="484632"/>
-          </a:xfrm>
-          <a:prstGeom prst="rightArrow">
-            <a:avLst/>
-          </a:prstGeom>
-        </p:spPr>
-        <p:style>
-          <a:lnRef idx="2">
-            <a:schemeClr val="accent1">
-              <a:shade val="50000"/>
-            </a:schemeClr>
-          </a:lnRef>
-          <a:fillRef idx="1">
-            <a:schemeClr val="accent1"/>
-          </a:fillRef>
-          <a:effectRef idx="0">
-            <a:schemeClr val="accent1"/>
-          </a:effectRef>
-          <a:fontRef idx="minor">
-            <a:schemeClr val="lt1"/>
-          </a:fontRef>
-        </p:style>
-        <p:txBody>
-          <a:bodyPr rtlCol="0" anchor="ctr"/>
-          <a:lstStyle/>
-          <a:p>
-            <a:pPr algn="ctr"/>
             <a:endParaRPr lang="en-US"/>
           </a:p>
         </p:txBody>
@@ -14316,7 +14315,7 @@
             <p:spPr>
               <a:xfrm>
                 <a:off x="218318" y="1951649"/>
-                <a:ext cx="6556199" cy="3416320"/>
+                <a:ext cx="6556199" cy="3139321"/>
               </a:xfrm>
               <a:prstGeom prst="rect">
                 <a:avLst/>
@@ -14333,7 +14332,7 @@
                   <a:buFont typeface="Arial" charset="0"/>
                   <a:buChar char="•"/>
                 </a:pPr>
-                <a:endParaRPr lang="en-US" dirty="0"/>
+                <a:endParaRPr lang="en-US" dirty="0" smtClean="0"/>
               </a:p>
               <a:p>
                 <a:pPr marL="285750" indent="-285750">
@@ -14405,11 +14404,7 @@
                 </a:r>
                 <a:r>
                   <a:rPr lang="en-US" dirty="0" smtClean="0"/>
-                  <a:t>Is 1 because the node with value 2 is </a:t>
-                </a:r>
-                <a:r>
-                  <a:rPr lang="en-US" smtClean="0"/>
-                  <a:t>an input</a:t>
+                  <a:t>Is 1 because the node with value 2 is an input</a:t>
                 </a:r>
                 <a:endParaRPr lang="en-US" dirty="0"/>
               </a:p>
@@ -14440,152 +14435,22 @@
                 </a:pPr>
                 <a14:m>
                   <m:oMath xmlns:m="http://schemas.openxmlformats.org/officeDocument/2006/math">
-                    <m:sSub>
-                      <m:sSubPr>
-                        <m:ctrlPr>
-                          <a:rPr lang="en-US" i="1">
-                            <a:latin typeface="Cambria Math" charset="0"/>
-                            <a:ea typeface="Cambria Math" charset="0"/>
-                            <a:cs typeface="Cambria Math" charset="0"/>
-                          </a:rPr>
-                        </m:ctrlPr>
-                      </m:sSubPr>
-                      <m:e>
-                        <m:r>
-                          <a:rPr lang="en-US" i="1">
-                            <a:latin typeface="Cambria Math" charset="0"/>
-                            <a:ea typeface="Cambria Math" charset="0"/>
-                            <a:cs typeface="Cambria Math" charset="0"/>
-                          </a:rPr>
-                          <m:t>𝜃</m:t>
-                        </m:r>
-                      </m:e>
-                      <m:sub>
-                        <m:r>
-                          <a:rPr lang="en-US" i="1">
-                            <a:latin typeface="Cambria Math" charset="0"/>
-                            <a:ea typeface="Cambria Math" charset="0"/>
-                            <a:cs typeface="Cambria Math" charset="0"/>
-                          </a:rPr>
-                          <m:t>𝑖</m:t>
-                        </m:r>
-                      </m:sub>
-                    </m:sSub>
                     <m:r>
-                      <a:rPr lang="en-US" i="1">
+                      <a:rPr lang="en-US" b="0" i="1" smtClean="0">
                         <a:latin typeface="Cambria Math" charset="0"/>
                         <a:ea typeface="Cambria Math" charset="0"/>
                         <a:cs typeface="Cambria Math" charset="0"/>
                       </a:rPr>
-                      <m:t>←</m:t>
+                      <m:t>𝑛𝑒𝑤</m:t>
                     </m:r>
-                    <m:sSub>
-                      <m:sSubPr>
-                        <m:ctrlPr>
-                          <a:rPr lang="en-US" i="1">
-                            <a:latin typeface="Cambria Math" charset="0"/>
-                            <a:ea typeface="Cambria Math" charset="0"/>
-                            <a:cs typeface="Cambria Math" charset="0"/>
-                          </a:rPr>
-                        </m:ctrlPr>
-                      </m:sSubPr>
-                      <m:e>
-                        <m:r>
-                          <a:rPr lang="en-US" i="1">
-                            <a:latin typeface="Cambria Math" charset="0"/>
-                            <a:ea typeface="Cambria Math" charset="0"/>
-                            <a:cs typeface="Cambria Math" charset="0"/>
-                          </a:rPr>
-                          <m:t>𝜃</m:t>
-                        </m:r>
-                      </m:e>
-                      <m:sub>
-                        <m:r>
-                          <a:rPr lang="en-US" i="1">
-                            <a:latin typeface="Cambria Math" charset="0"/>
-                            <a:ea typeface="Cambria Math" charset="0"/>
-                            <a:cs typeface="Cambria Math" charset="0"/>
-                          </a:rPr>
-                          <m:t>𝑖</m:t>
-                        </m:r>
-                      </m:sub>
-                    </m:sSub>
                     <m:r>
-                      <a:rPr lang="en-US" i="1">
+                      <a:rPr lang="en-US" b="0" i="1" smtClean="0">
                         <a:latin typeface="Cambria Math" charset="0"/>
                         <a:ea typeface="Cambria Math" charset="0"/>
                         <a:cs typeface="Cambria Math" charset="0"/>
                       </a:rPr>
-                      <m:t>−</m:t>
+                      <m:t>_</m:t>
                     </m:r>
-                    <m:sSub>
-                      <m:sSubPr>
-                        <m:ctrlPr>
-                          <a:rPr lang="en-US" i="1">
-                            <a:latin typeface="Cambria Math" charset="0"/>
-                          </a:rPr>
-                        </m:ctrlPr>
-                      </m:sSubPr>
-                      <m:e>
-                        <m:r>
-                          <a:rPr lang="en-US" i="1">
-                            <a:latin typeface="Cambria Math" charset="0"/>
-                          </a:rPr>
-                          <m:t>𝑔𝑟𝑎𝑑𝑖𝑒𝑛𝑡</m:t>
-                        </m:r>
-                      </m:e>
-                      <m:sub>
-                        <m:r>
-                          <a:rPr lang="en-US" i="1">
-                            <a:latin typeface="Cambria Math" charset="0"/>
-                          </a:rPr>
-                          <m:t>𝑖</m:t>
-                        </m:r>
-                      </m:sub>
-                    </m:sSub>
-                    <m:r>
-                      <a:rPr lang="en-US" i="1">
-                        <a:latin typeface="Cambria Math" charset="0"/>
-                        <a:ea typeface="Cambria Math" charset="0"/>
-                        <a:cs typeface="Cambria Math" charset="0"/>
-                      </a:rPr>
-                      <m:t>×</m:t>
-                    </m:r>
-                    <m:r>
-                      <a:rPr lang="en-US" i="1">
-                        <a:latin typeface="Cambria Math" charset="0"/>
-                        <a:ea typeface="Cambria Math" charset="0"/>
-                        <a:cs typeface="Cambria Math" charset="0"/>
-                      </a:rPr>
-                      <m:t>𝐿𝐸𝐴𝑅𝑁𝐼𝑁𝐺</m:t>
-                    </m:r>
-                    <m:r>
-                      <a:rPr lang="en-US" i="1">
-                        <a:latin typeface="Cambria Math" charset="0"/>
-                        <a:ea typeface="Cambria Math" charset="0"/>
-                        <a:cs typeface="Cambria Math" charset="0"/>
-                      </a:rPr>
-                      <m:t> </m:t>
-                    </m:r>
-                    <m:r>
-                      <a:rPr lang="en-US" i="1">
-                        <a:latin typeface="Cambria Math" charset="0"/>
-                        <a:ea typeface="Cambria Math" charset="0"/>
-                        <a:cs typeface="Cambria Math" charset="0"/>
-                      </a:rPr>
-                      <m:t>𝑅𝐴𝑇𝐸</m:t>
-                    </m:r>
-                  </m:oMath>
-                </a14:m>
-                <a:endParaRPr lang="en-US" dirty="0"/>
-              </a:p>
-              <a:p>
-                <a:pPr marL="285750" indent="-285750">
-                  <a:buFont typeface="Arial" charset="0"/>
-                  <a:buChar char="•"/>
-                </a:pPr>
-                <a14:m>
-                  <m:oMath xmlns:m="http://schemas.openxmlformats.org/officeDocument/2006/math">
                     <m:r>
                       <a:rPr lang="en-US" b="0" i="1" smtClean="0">
                         <a:latin typeface="Cambria Math" charset="0"/>
@@ -14593,6 +14458,14 @@
                         <a:cs typeface="Cambria Math" charset="0"/>
                       </a:rPr>
                       <m:t>𝑤</m:t>
+                    </m:r>
+                    <m:r>
+                      <a:rPr lang="en-US" b="0" i="1" smtClean="0">
+                        <a:latin typeface="Cambria Math" charset="0"/>
+                        <a:ea typeface="Cambria Math" charset="0"/>
+                        <a:cs typeface="Cambria Math" charset="0"/>
+                      </a:rPr>
+                      <m:t>𝑒𝑖𝑔h𝑡</m:t>
                     </m:r>
                     <m:r>
                       <a:rPr lang="en-US" b="0" i="1" smtClean="0">
@@ -14611,6 +14484,18 @@
                   <a:buFont typeface="Arial" charset="0"/>
                   <a:buChar char="•"/>
                 </a:pPr>
+                <a:r>
+                  <a:rPr lang="en-US" dirty="0" smtClean="0"/>
+                  <a:t>(note this is a </a:t>
+                </a:r>
+                <a:r>
+                  <a:rPr lang="en-US" dirty="0" err="1" smtClean="0"/>
+                  <a:t>batchsize</a:t>
+                </a:r>
+                <a:r>
+                  <a:rPr lang="en-US" dirty="0" smtClean="0"/>
+                  <a:t> = 1)</a:t>
+                </a:r>
                 <a:endParaRPr lang="en-US" dirty="0"/>
               </a:p>
               <a:p>
@@ -14635,7 +14520,7 @@
             <p:spPr>
               <a:xfrm>
                 <a:off x="218318" y="1951649"/>
-                <a:ext cx="6556199" cy="3416320"/>
+                <a:ext cx="6556199" cy="3139321"/>
               </a:xfrm>
               <a:prstGeom prst="rect">
                 <a:avLst/>
@@ -14678,7 +14563,7 @@
         </p:blipFill>
         <p:spPr>
           <a:xfrm>
-            <a:off x="7002966" y="3281111"/>
+            <a:off x="6676116" y="2661142"/>
             <a:ext cx="5029200" cy="3378200"/>
           </a:xfrm>
           <a:prstGeom prst="rect">
@@ -14686,6 +14571,206 @@
           </a:prstGeom>
         </p:spPr>
       </p:pic>
+      <p:sp>
+        <p:nvSpPr>
+          <p:cNvPr id="14" name="TextBox 13"/>
+          <p:cNvSpPr txBox="1"/>
+          <p:nvPr/>
+        </p:nvSpPr>
+        <p:spPr>
+          <a:xfrm>
+            <a:off x="7615429" y="1450705"/>
+            <a:ext cx="979755" cy="369332"/>
+          </a:xfrm>
+          <a:prstGeom prst="rect">
+            <a:avLst/>
+          </a:prstGeom>
+          <a:noFill/>
+        </p:spPr>
+        <p:txBody>
+          <a:bodyPr wrap="none" rtlCol="0">
+            <a:spAutoFit/>
+          </a:bodyPr>
+          <a:lstStyle/>
+          <a:p>
+            <a:r>
+              <a:rPr lang="en-US" dirty="0"/>
+              <a:t>w = </a:t>
+            </a:r>
+            <a:r>
+              <a:rPr lang="en-US" dirty="0" smtClean="0"/>
+              <a:t>3.92</a:t>
+            </a:r>
+            <a:endParaRPr lang="en-US" dirty="0"/>
+          </a:p>
+        </p:txBody>
+      </p:sp>
+      <p:sp>
+        <p:nvSpPr>
+          <p:cNvPr id="3" name="TextBox 2"/>
+          <p:cNvSpPr txBox="1"/>
+          <p:nvPr/>
+        </p:nvSpPr>
+        <p:spPr>
+          <a:xfrm>
+            <a:off x="7243190" y="5934670"/>
+            <a:ext cx="4788976" cy="923330"/>
+          </a:xfrm>
+          <a:prstGeom prst="rect">
+            <a:avLst/>
+          </a:prstGeom>
+          <a:noFill/>
+        </p:spPr>
+        <p:txBody>
+          <a:bodyPr wrap="square" rtlCol="0">
+            <a:spAutoFit/>
+          </a:bodyPr>
+          <a:lstStyle/>
+          <a:p>
+            <a:r>
+              <a:rPr lang="en-US" dirty="0" smtClean="0"/>
+              <a:t>A graph of multiple iterations of gradient decent to adjust weights</a:t>
+            </a:r>
+            <a:r>
+              <a:rPr lang="mr-IN" dirty="0" smtClean="0"/>
+              <a:t>…</a:t>
+            </a:r>
+            <a:r>
+              <a:rPr lang="en-US" dirty="0" smtClean="0"/>
+              <a:t> see how the predictions get closer to the expected over iterations</a:t>
+            </a:r>
+            <a:endParaRPr lang="en-US" dirty="0"/>
+          </a:p>
+        </p:txBody>
+      </p:sp>
+      <p:sp>
+        <p:nvSpPr>
+          <p:cNvPr id="7" name="TextBox 6"/>
+          <p:cNvSpPr txBox="1"/>
+          <p:nvPr/>
+        </p:nvSpPr>
+        <p:spPr>
+          <a:xfrm>
+            <a:off x="6400831" y="1100333"/>
+            <a:ext cx="1245854" cy="369332"/>
+          </a:xfrm>
+          <a:prstGeom prst="rect">
+            <a:avLst/>
+          </a:prstGeom>
+          <a:noFill/>
+        </p:spPr>
+        <p:txBody>
+          <a:bodyPr wrap="none" rtlCol="0">
+            <a:spAutoFit/>
+          </a:bodyPr>
+          <a:lstStyle/>
+          <a:p>
+            <a:r>
+              <a:rPr lang="en-US" dirty="0" smtClean="0"/>
+              <a:t>Input Node</a:t>
+            </a:r>
+            <a:endParaRPr lang="en-US" dirty="0"/>
+          </a:p>
+        </p:txBody>
+      </p:sp>
+      <p:sp>
+        <p:nvSpPr>
+          <p:cNvPr id="8" name="TextBox 7"/>
+          <p:cNvSpPr txBox="1"/>
+          <p:nvPr/>
+        </p:nvSpPr>
+        <p:spPr>
+          <a:xfrm>
+            <a:off x="8336328" y="1112906"/>
+            <a:ext cx="1417376" cy="369332"/>
+          </a:xfrm>
+          <a:prstGeom prst="rect">
+            <a:avLst/>
+          </a:prstGeom>
+          <a:noFill/>
+        </p:spPr>
+        <p:txBody>
+          <a:bodyPr wrap="none" rtlCol="0">
+            <a:spAutoFit/>
+          </a:bodyPr>
+          <a:lstStyle/>
+          <a:p>
+            <a:r>
+              <a:rPr lang="en-US" smtClean="0"/>
+              <a:t>Output Node</a:t>
+            </a:r>
+            <a:endParaRPr lang="en-US"/>
+          </a:p>
+        </p:txBody>
+      </p:sp>
+      <p:sp>
+        <p:nvSpPr>
+          <p:cNvPr id="17" name="TextBox 16"/>
+          <p:cNvSpPr txBox="1"/>
+          <p:nvPr/>
+        </p:nvSpPr>
+        <p:spPr>
+          <a:xfrm>
+            <a:off x="10115389" y="1664167"/>
+            <a:ext cx="2159053" cy="369332"/>
+          </a:xfrm>
+          <a:prstGeom prst="rect">
+            <a:avLst/>
+          </a:prstGeom>
+          <a:noFill/>
+        </p:spPr>
+        <p:txBody>
+          <a:bodyPr wrap="none" rtlCol="0">
+            <a:spAutoFit/>
+          </a:bodyPr>
+          <a:lstStyle/>
+          <a:p>
+            <a:r>
+              <a:rPr lang="en-US" dirty="0"/>
+              <a:t>Predicted value: </a:t>
+            </a:r>
+            <a:r>
+              <a:rPr lang="nb-NO" dirty="0"/>
+              <a:t>7.84</a:t>
+            </a:r>
+            <a:endParaRPr lang="en-US" dirty="0"/>
+          </a:p>
+        </p:txBody>
+      </p:sp>
+      <p:sp>
+        <p:nvSpPr>
+          <p:cNvPr id="18" name="TextBox 17"/>
+          <p:cNvSpPr txBox="1"/>
+          <p:nvPr/>
+        </p:nvSpPr>
+        <p:spPr>
+          <a:xfrm>
+            <a:off x="10136026" y="2420974"/>
+            <a:ext cx="1179618" cy="369332"/>
+          </a:xfrm>
+          <a:prstGeom prst="rect">
+            <a:avLst/>
+          </a:prstGeom>
+          <a:noFill/>
+        </p:spPr>
+        <p:txBody>
+          <a:bodyPr wrap="none" rtlCol="0">
+            <a:spAutoFit/>
+          </a:bodyPr>
+          <a:lstStyle/>
+          <a:p>
+            <a:r>
+              <a:rPr lang="en-US" dirty="0"/>
+              <a:t>Error: </a:t>
+            </a:r>
+            <a:r>
+              <a:rPr lang="nb-NO" dirty="0"/>
+              <a:t>1.84</a:t>
+            </a:r>
+            <a:endParaRPr lang="en-US" dirty="0"/>
+          </a:p>
+        </p:txBody>
+      </p:sp>
     </p:spTree>
     <p:extLst>
       <p:ext uri="{BB962C8B-B14F-4D97-AF65-F5344CB8AC3E}">
@@ -14711,9 +14796,341 @@
   <p:timing>
     <p:tnLst>
       <p:par>
-        <p:cTn id="1" dur="indefinite" restart="never" nodeType="tmRoot"/>
+        <p:cTn id="1" dur="indefinite" restart="never" nodeType="tmRoot">
+          <p:childTnLst>
+            <p:seq concurrent="1" nextAc="seek">
+              <p:cTn id="2" dur="indefinite" nodeType="mainSeq">
+                <p:childTnLst>
+                  <p:par>
+                    <p:cTn id="3" fill="hold">
+                      <p:stCondLst>
+                        <p:cond delay="indefinite"/>
+                      </p:stCondLst>
+                      <p:childTnLst>
+                        <p:par>
+                          <p:cTn id="4" fill="hold">
+                            <p:stCondLst>
+                              <p:cond delay="0"/>
+                            </p:stCondLst>
+                            <p:childTnLst>
+                              <p:par>
+                                <p:cTn id="5" presetID="10" presetClass="exit" presetSubtype="0" fill="hold" grpId="0" nodeType="clickEffect">
+                                  <p:stCondLst>
+                                    <p:cond delay="0"/>
+                                  </p:stCondLst>
+                                  <p:childTnLst>
+                                    <p:animEffect transition="out" filter="fade">
+                                      <p:cBhvr>
+                                        <p:cTn id="6" dur="500"/>
+                                        <p:tgtEl>
+                                          <p:spTgt spid="9"/>
+                                        </p:tgtEl>
+                                      </p:cBhvr>
+                                    </p:animEffect>
+                                    <p:set>
+                                      <p:cBhvr>
+                                        <p:cTn id="7" dur="1" fill="hold">
+                                          <p:stCondLst>
+                                            <p:cond delay="499"/>
+                                          </p:stCondLst>
+                                        </p:cTn>
+                                        <p:tgtEl>
+                                          <p:spTgt spid="9"/>
+                                        </p:tgtEl>
+                                        <p:attrNameLst>
+                                          <p:attrName>style.visibility</p:attrName>
+                                        </p:attrNameLst>
+                                      </p:cBhvr>
+                                      <p:to>
+                                        <p:strVal val="hidden"/>
+                                      </p:to>
+                                    </p:set>
+                                  </p:childTnLst>
+                                </p:cTn>
+                              </p:par>
+                            </p:childTnLst>
+                          </p:cTn>
+                        </p:par>
+                        <p:par>
+                          <p:cTn id="8" fill="hold">
+                            <p:stCondLst>
+                              <p:cond delay="500"/>
+                            </p:stCondLst>
+                            <p:childTnLst>
+                              <p:par>
+                                <p:cTn id="9" presetID="1" presetClass="entr" presetSubtype="0" fill="hold" grpId="0" nodeType="afterEffect">
+                                  <p:stCondLst>
+                                    <p:cond delay="0"/>
+                                  </p:stCondLst>
+                                  <p:childTnLst>
+                                    <p:set>
+                                      <p:cBhvr>
+                                        <p:cTn id="10" dur="1" fill="hold">
+                                          <p:stCondLst>
+                                            <p:cond delay="0"/>
+                                          </p:stCondLst>
+                                        </p:cTn>
+                                        <p:tgtEl>
+                                          <p:spTgt spid="14"/>
+                                        </p:tgtEl>
+                                        <p:attrNameLst>
+                                          <p:attrName>style.visibility</p:attrName>
+                                        </p:attrNameLst>
+                                      </p:cBhvr>
+                                      <p:to>
+                                        <p:strVal val="visible"/>
+                                      </p:to>
+                                    </p:set>
+                                  </p:childTnLst>
+                                </p:cTn>
+                              </p:par>
+                            </p:childTnLst>
+                          </p:cTn>
+                        </p:par>
+                      </p:childTnLst>
+                    </p:cTn>
+                  </p:par>
+                  <p:par>
+                    <p:cTn id="11" fill="hold">
+                      <p:stCondLst>
+                        <p:cond delay="indefinite"/>
+                      </p:stCondLst>
+                      <p:childTnLst>
+                        <p:par>
+                          <p:cTn id="12" fill="hold">
+                            <p:stCondLst>
+                              <p:cond delay="0"/>
+                            </p:stCondLst>
+                            <p:childTnLst>
+                              <p:par>
+                                <p:cTn id="13" presetID="10" presetClass="exit" presetSubtype="0" fill="hold" grpId="0" nodeType="clickEffect">
+                                  <p:stCondLst>
+                                    <p:cond delay="0"/>
+                                  </p:stCondLst>
+                                  <p:childTnLst>
+                                    <p:animEffect transition="out" filter="fade">
+                                      <p:cBhvr>
+                                        <p:cTn id="14" dur="500"/>
+                                        <p:tgtEl>
+                                          <p:spTgt spid="11"/>
+                                        </p:tgtEl>
+                                      </p:cBhvr>
+                                    </p:animEffect>
+                                    <p:set>
+                                      <p:cBhvr>
+                                        <p:cTn id="15" dur="1" fill="hold">
+                                          <p:stCondLst>
+                                            <p:cond delay="499"/>
+                                          </p:stCondLst>
+                                        </p:cTn>
+                                        <p:tgtEl>
+                                          <p:spTgt spid="11"/>
+                                        </p:tgtEl>
+                                        <p:attrNameLst>
+                                          <p:attrName>style.visibility</p:attrName>
+                                        </p:attrNameLst>
+                                      </p:cBhvr>
+                                      <p:to>
+                                        <p:strVal val="hidden"/>
+                                      </p:to>
+                                    </p:set>
+                                  </p:childTnLst>
+                                </p:cTn>
+                              </p:par>
+                            </p:childTnLst>
+                          </p:cTn>
+                        </p:par>
+                      </p:childTnLst>
+                    </p:cTn>
+                  </p:par>
+                  <p:par>
+                    <p:cTn id="16" fill="hold">
+                      <p:stCondLst>
+                        <p:cond delay="indefinite"/>
+                      </p:stCondLst>
+                      <p:childTnLst>
+                        <p:par>
+                          <p:cTn id="17" fill="hold">
+                            <p:stCondLst>
+                              <p:cond delay="0"/>
+                            </p:stCondLst>
+                            <p:childTnLst>
+                              <p:par>
+                                <p:cTn id="18" presetID="10" presetClass="entr" presetSubtype="0" fill="hold" grpId="0" nodeType="clickEffect">
+                                  <p:stCondLst>
+                                    <p:cond delay="0"/>
+                                  </p:stCondLst>
+                                  <p:childTnLst>
+                                    <p:set>
+                                      <p:cBhvr>
+                                        <p:cTn id="19" dur="1" fill="hold">
+                                          <p:stCondLst>
+                                            <p:cond delay="0"/>
+                                          </p:stCondLst>
+                                        </p:cTn>
+                                        <p:tgtEl>
+                                          <p:spTgt spid="17"/>
+                                        </p:tgtEl>
+                                        <p:attrNameLst>
+                                          <p:attrName>style.visibility</p:attrName>
+                                        </p:attrNameLst>
+                                      </p:cBhvr>
+                                      <p:to>
+                                        <p:strVal val="visible"/>
+                                      </p:to>
+                                    </p:set>
+                                    <p:animEffect transition="in" filter="fade">
+                                      <p:cBhvr>
+                                        <p:cTn id="20" dur="500"/>
+                                        <p:tgtEl>
+                                          <p:spTgt spid="17"/>
+                                        </p:tgtEl>
+                                      </p:cBhvr>
+                                    </p:animEffect>
+                                  </p:childTnLst>
+                                </p:cTn>
+                              </p:par>
+                            </p:childTnLst>
+                          </p:cTn>
+                        </p:par>
+                      </p:childTnLst>
+                    </p:cTn>
+                  </p:par>
+                  <p:par>
+                    <p:cTn id="21" fill="hold">
+                      <p:stCondLst>
+                        <p:cond delay="indefinite"/>
+                      </p:stCondLst>
+                      <p:childTnLst>
+                        <p:par>
+                          <p:cTn id="22" fill="hold">
+                            <p:stCondLst>
+                              <p:cond delay="0"/>
+                            </p:stCondLst>
+                            <p:childTnLst>
+                              <p:par>
+                                <p:cTn id="23" presetID="10" presetClass="exit" presetSubtype="0" fill="hold" grpId="0" nodeType="clickEffect">
+                                  <p:stCondLst>
+                                    <p:cond delay="0"/>
+                                  </p:stCondLst>
+                                  <p:childTnLst>
+                                    <p:animEffect transition="out" filter="fade">
+                                      <p:cBhvr>
+                                        <p:cTn id="24" dur="500"/>
+                                        <p:tgtEl>
+                                          <p:spTgt spid="13"/>
+                                        </p:tgtEl>
+                                      </p:cBhvr>
+                                    </p:animEffect>
+                                    <p:set>
+                                      <p:cBhvr>
+                                        <p:cTn id="25" dur="1" fill="hold">
+                                          <p:stCondLst>
+                                            <p:cond delay="499"/>
+                                          </p:stCondLst>
+                                        </p:cTn>
+                                        <p:tgtEl>
+                                          <p:spTgt spid="13"/>
+                                        </p:tgtEl>
+                                        <p:attrNameLst>
+                                          <p:attrName>style.visibility</p:attrName>
+                                        </p:attrNameLst>
+                                      </p:cBhvr>
+                                      <p:to>
+                                        <p:strVal val="hidden"/>
+                                      </p:to>
+                                    </p:set>
+                                  </p:childTnLst>
+                                </p:cTn>
+                              </p:par>
+                            </p:childTnLst>
+                          </p:cTn>
+                        </p:par>
+                      </p:childTnLst>
+                    </p:cTn>
+                  </p:par>
+                  <p:par>
+                    <p:cTn id="26" fill="hold">
+                      <p:stCondLst>
+                        <p:cond delay="indefinite"/>
+                      </p:stCondLst>
+                      <p:childTnLst>
+                        <p:par>
+                          <p:cTn id="27" fill="hold">
+                            <p:stCondLst>
+                              <p:cond delay="0"/>
+                            </p:stCondLst>
+                            <p:childTnLst>
+                              <p:par>
+                                <p:cTn id="28" presetID="10" presetClass="entr" presetSubtype="0" fill="hold" grpId="1" nodeType="clickEffect">
+                                  <p:stCondLst>
+                                    <p:cond delay="0"/>
+                                  </p:stCondLst>
+                                  <p:childTnLst>
+                                    <p:set>
+                                      <p:cBhvr>
+                                        <p:cTn id="29" dur="1" fill="hold">
+                                          <p:stCondLst>
+                                            <p:cond delay="0"/>
+                                          </p:stCondLst>
+                                        </p:cTn>
+                                        <p:tgtEl>
+                                          <p:spTgt spid="18"/>
+                                        </p:tgtEl>
+                                        <p:attrNameLst>
+                                          <p:attrName>style.visibility</p:attrName>
+                                        </p:attrNameLst>
+                                      </p:cBhvr>
+                                      <p:to>
+                                        <p:strVal val="visible"/>
+                                      </p:to>
+                                    </p:set>
+                                    <p:animEffect transition="in" filter="fade">
+                                      <p:cBhvr>
+                                        <p:cTn id="30" dur="500"/>
+                                        <p:tgtEl>
+                                          <p:spTgt spid="18"/>
+                                        </p:tgtEl>
+                                      </p:cBhvr>
+                                    </p:animEffect>
+                                  </p:childTnLst>
+                                </p:cTn>
+                              </p:par>
+                            </p:childTnLst>
+                          </p:cTn>
+                        </p:par>
+                      </p:childTnLst>
+                    </p:cTn>
+                  </p:par>
+                </p:childTnLst>
+              </p:cTn>
+              <p:prevCondLst>
+                <p:cond evt="onPrev" delay="0">
+                  <p:tgtEl>
+                    <p:sldTgt/>
+                  </p:tgtEl>
+                </p:cond>
+              </p:prevCondLst>
+              <p:nextCondLst>
+                <p:cond evt="onNext" delay="0">
+                  <p:tgtEl>
+                    <p:sldTgt/>
+                  </p:tgtEl>
+                </p:cond>
+              </p:nextCondLst>
+            </p:seq>
+          </p:childTnLst>
+        </p:cTn>
       </p:par>
     </p:tnLst>
+    <p:bldLst>
+      <p:bldP spid="9" grpId="0"/>
+      <p:bldP spid="11" grpId="0"/>
+      <p:bldP spid="13" grpId="0"/>
+      <p:bldP spid="14" grpId="0"/>
+      <p:bldP spid="17" grpId="0"/>
+      <p:bldP spid="18" grpId="1"/>
+    </p:bldLst>
   </p:timing>
 </p:sld>
 </file>
@@ -18852,6 +19269,13 @@
       </p:transition>
     </mc:Fallback>
   </mc:AlternateContent>
+  <p:timing>
+    <p:tnLst>
+      <p:par>
+        <p:cTn id="1" dur="indefinite" restart="never" nodeType="tmRoot"/>
+      </p:par>
+    </p:tnLst>
+  </p:timing>
 </p:sld>
 </file>
 

</xml_diff>